<commit_message>
Cleaned up project folder
</commit_message>
<xml_diff>
--- a/ConnectedBlinds.pptx
+++ b/ConnectedBlinds.pptx
@@ -12,6 +12,7 @@
     <p:sldId id="259" r:id="rId6"/>
     <p:sldId id="261" r:id="rId7"/>
     <p:sldId id="262" r:id="rId8"/>
+    <p:sldId id="263" r:id="rId9"/>
   </p:sldIdLst>
   <p:sldSz cx="12192000" cy="6858000"/>
   <p:notesSz cx="6858000" cy="9144000"/>
@@ -303,7 +304,7 @@
           <a:p>
             <a:fld id="{7B38B6E8-3AA1-4F4F-AE09-D7FAD0B71DF3}" type="datetimeFigureOut">
               <a:rPr lang="en-GB" smtClean="0"/>
-              <a:t>27/09/2017</a:t>
+              <a:t>28/09/2017</a:t>
             </a:fld>
             <a:endParaRPr lang="en-GB"/>
           </a:p>
@@ -601,7 +602,7 @@
           <a:p>
             <a:fld id="{7B38B6E8-3AA1-4F4F-AE09-D7FAD0B71DF3}" type="datetimeFigureOut">
               <a:rPr lang="en-GB" smtClean="0"/>
-              <a:t>27/09/2017</a:t>
+              <a:t>28/09/2017</a:t>
             </a:fld>
             <a:endParaRPr lang="en-GB"/>
           </a:p>
@@ -793,7 +794,7 @@
           <a:p>
             <a:fld id="{7B38B6E8-3AA1-4F4F-AE09-D7FAD0B71DF3}" type="datetimeFigureOut">
               <a:rPr lang="en-GB" smtClean="0"/>
-              <a:t>27/09/2017</a:t>
+              <a:t>28/09/2017</a:t>
             </a:fld>
             <a:endParaRPr lang="en-GB"/>
           </a:p>
@@ -1054,7 +1055,7 @@
           <a:p>
             <a:fld id="{7B38B6E8-3AA1-4F4F-AE09-D7FAD0B71DF3}" type="datetimeFigureOut">
               <a:rPr lang="en-GB" smtClean="0"/>
-              <a:t>27/09/2017</a:t>
+              <a:t>28/09/2017</a:t>
             </a:fld>
             <a:endParaRPr lang="en-GB"/>
           </a:p>
@@ -1478,7 +1479,7 @@
           <a:p>
             <a:fld id="{7B38B6E8-3AA1-4F4F-AE09-D7FAD0B71DF3}" type="datetimeFigureOut">
               <a:rPr lang="en-GB" smtClean="0"/>
-              <a:t>27/09/2017</a:t>
+              <a:t>28/09/2017</a:t>
             </a:fld>
             <a:endParaRPr lang="en-GB"/>
           </a:p>
@@ -2015,7 +2016,7 @@
           <a:p>
             <a:fld id="{7B38B6E8-3AA1-4F4F-AE09-D7FAD0B71DF3}" type="datetimeFigureOut">
               <a:rPr lang="en-GB" smtClean="0"/>
-              <a:t>27/09/2017</a:t>
+              <a:t>28/09/2017</a:t>
             </a:fld>
             <a:endParaRPr lang="en-GB"/>
           </a:p>
@@ -2879,7 +2880,7 @@
           <a:p>
             <a:fld id="{7B38B6E8-3AA1-4F4F-AE09-D7FAD0B71DF3}" type="datetimeFigureOut">
               <a:rPr lang="en-GB" smtClean="0"/>
-              <a:t>27/09/2017</a:t>
+              <a:t>28/09/2017</a:t>
             </a:fld>
             <a:endParaRPr lang="en-GB"/>
           </a:p>
@@ -3049,7 +3050,7 @@
           <a:p>
             <a:fld id="{7B38B6E8-3AA1-4F4F-AE09-D7FAD0B71DF3}" type="datetimeFigureOut">
               <a:rPr lang="en-GB" smtClean="0"/>
-              <a:t>27/09/2017</a:t>
+              <a:t>28/09/2017</a:t>
             </a:fld>
             <a:endParaRPr lang="en-GB"/>
           </a:p>
@@ -3233,7 +3234,7 @@
           <a:p>
             <a:fld id="{7B38B6E8-3AA1-4F4F-AE09-D7FAD0B71DF3}" type="datetimeFigureOut">
               <a:rPr lang="en-GB" smtClean="0"/>
-              <a:t>27/09/2017</a:t>
+              <a:t>28/09/2017</a:t>
             </a:fld>
             <a:endParaRPr lang="en-GB"/>
           </a:p>
@@ -3403,7 +3404,7 @@
           <a:p>
             <a:fld id="{7B38B6E8-3AA1-4F4F-AE09-D7FAD0B71DF3}" type="datetimeFigureOut">
               <a:rPr lang="en-GB" smtClean="0"/>
-              <a:t>27/09/2017</a:t>
+              <a:t>28/09/2017</a:t>
             </a:fld>
             <a:endParaRPr lang="en-GB"/>
           </a:p>
@@ -3647,7 +3648,7 @@
           <a:p>
             <a:fld id="{7B38B6E8-3AA1-4F4F-AE09-D7FAD0B71DF3}" type="datetimeFigureOut">
               <a:rPr lang="en-GB" smtClean="0"/>
-              <a:t>27/09/2017</a:t>
+              <a:t>28/09/2017</a:t>
             </a:fld>
             <a:endParaRPr lang="en-GB"/>
           </a:p>
@@ -3883,7 +3884,7 @@
           <a:p>
             <a:fld id="{7B38B6E8-3AA1-4F4F-AE09-D7FAD0B71DF3}" type="datetimeFigureOut">
               <a:rPr lang="en-GB" smtClean="0"/>
-              <a:t>27/09/2017</a:t>
+              <a:t>28/09/2017</a:t>
             </a:fld>
             <a:endParaRPr lang="en-GB"/>
           </a:p>
@@ -4354,7 +4355,7 @@
           <a:p>
             <a:fld id="{7B38B6E8-3AA1-4F4F-AE09-D7FAD0B71DF3}" type="datetimeFigureOut">
               <a:rPr lang="en-GB" smtClean="0"/>
-              <a:t>27/09/2017</a:t>
+              <a:t>28/09/2017</a:t>
             </a:fld>
             <a:endParaRPr lang="en-GB"/>
           </a:p>
@@ -4477,7 +4478,7 @@
           <a:p>
             <a:fld id="{7B38B6E8-3AA1-4F4F-AE09-D7FAD0B71DF3}" type="datetimeFigureOut">
               <a:rPr lang="en-GB" smtClean="0"/>
-              <a:t>27/09/2017</a:t>
+              <a:t>28/09/2017</a:t>
             </a:fld>
             <a:endParaRPr lang="en-GB"/>
           </a:p>
@@ -4572,7 +4573,7 @@
           <a:p>
             <a:fld id="{7B38B6E8-3AA1-4F4F-AE09-D7FAD0B71DF3}" type="datetimeFigureOut">
               <a:rPr lang="en-GB" smtClean="0"/>
-              <a:t>27/09/2017</a:t>
+              <a:t>28/09/2017</a:t>
             </a:fld>
             <a:endParaRPr lang="en-GB"/>
           </a:p>
@@ -4827,7 +4828,7 @@
           <a:p>
             <a:fld id="{7B38B6E8-3AA1-4F4F-AE09-D7FAD0B71DF3}" type="datetimeFigureOut">
               <a:rPr lang="en-GB" smtClean="0"/>
-              <a:t>27/09/2017</a:t>
+              <a:t>28/09/2017</a:t>
             </a:fld>
             <a:endParaRPr lang="en-GB"/>
           </a:p>
@@ -5132,7 +5133,7 @@
           <a:p>
             <a:fld id="{7B38B6E8-3AA1-4F4F-AE09-D7FAD0B71DF3}" type="datetimeFigureOut">
               <a:rPr lang="en-GB" smtClean="0"/>
-              <a:t>27/09/2017</a:t>
+              <a:t>28/09/2017</a:t>
             </a:fld>
             <a:endParaRPr lang="en-GB"/>
           </a:p>
@@ -5366,7 +5367,7 @@
           <a:p>
             <a:fld id="{7B38B6E8-3AA1-4F4F-AE09-D7FAD0B71DF3}" type="datetimeFigureOut">
               <a:rPr lang="en-GB" smtClean="0"/>
-              <a:t>27/09/2017</a:t>
+              <a:t>28/09/2017</a:t>
             </a:fld>
             <a:endParaRPr lang="en-GB"/>
           </a:p>
@@ -6153,6 +6154,13 @@
   <p:clrMapOvr>
     <a:masterClrMapping/>
   </p:clrMapOvr>
+  <p:timing>
+    <p:tnLst>
+      <p:par>
+        <p:cTn id="1" dur="indefinite" restart="never" nodeType="tmRoot"/>
+      </p:par>
+    </p:tnLst>
+  </p:timing>
 </p:sld>
 </file>
 
@@ -6418,6 +6426,13 @@
   <p:clrMapOvr>
     <a:masterClrMapping/>
   </p:clrMapOvr>
+  <p:timing>
+    <p:tnLst>
+      <p:par>
+        <p:cTn id="1" dur="indefinite" restart="never" nodeType="tmRoot"/>
+      </p:par>
+    </p:tnLst>
+  </p:timing>
 </p:sld>
 </file>
 
@@ -6489,13 +6504,8 @@
             </a:r>
             <a:r>
               <a:rPr lang="en-GB" dirty="0" smtClean="0"/>
-              <a:t> </a:t>
-            </a:r>
-            <a:r>
-              <a:rPr lang="en-GB" dirty="0" smtClean="0"/>
-              <a:t>RS-2 servo</a:t>
-            </a:r>
-            <a:endParaRPr lang="en-GB" dirty="0" smtClean="0"/>
+              <a:t> RS-2 servo</a:t>
+            </a:r>
           </a:p>
           <a:p>
             <a:r>
@@ -6630,6 +6640,13 @@
   <p:clrMapOvr>
     <a:masterClrMapping/>
   </p:clrMapOvr>
+  <p:timing>
+    <p:tnLst>
+      <p:par>
+        <p:cTn id="1" dur="indefinite" restart="never" nodeType="tmRoot"/>
+      </p:par>
+    </p:tnLst>
+  </p:timing>
 </p:sld>
 </file>
 
@@ -6736,7 +6753,6 @@
               <a:rPr lang="en-GB" dirty="0" smtClean="0"/>
               <a:t> /auto</a:t>
             </a:r>
-            <a:endParaRPr lang="en-GB" dirty="0" smtClean="0"/>
           </a:p>
           <a:p>
             <a:r>
@@ -7021,7 +7037,7 @@
         <p:spPr/>
         <p:txBody>
           <a:bodyPr>
-            <a:normAutofit lnSpcReduction="10000"/>
+            <a:normAutofit fontScale="92500" lnSpcReduction="20000"/>
           </a:bodyPr>
           <a:lstStyle/>
           <a:p>
@@ -7091,11 +7107,7 @@
             </a:r>
             <a:r>
               <a:rPr lang="en-GB" dirty="0" smtClean="0"/>
-              <a:t>, </a:t>
-            </a:r>
-            <a:r>
-              <a:rPr lang="en-GB" dirty="0" smtClean="0"/>
-              <a:t>extern </a:t>
+              <a:t>, extern </a:t>
             </a:r>
             <a:r>
               <a:rPr lang="en-GB" dirty="0" err="1" smtClean="0"/>
@@ -7221,7 +7233,7 @@
               <a:t>Lägesbrytare</a:t>
             </a:r>
             <a:r>
-              <a:rPr lang="en-GB" dirty="0"/>
+              <a:rPr lang="en-GB" dirty="0" smtClean="0"/>
               <a:t> </a:t>
             </a:r>
             <a:r>
@@ -7236,6 +7248,22 @@
               <a:rPr lang="en-GB" dirty="0" err="1" smtClean="0"/>
               <a:t>fotoresistor</a:t>
             </a:r>
+            <a:endParaRPr lang="en-GB" dirty="0" smtClean="0"/>
+          </a:p>
+          <a:p>
+            <a:r>
+              <a:rPr lang="en-GB" dirty="0" smtClean="0"/>
+              <a:t>BT Master </a:t>
+            </a:r>
+            <a:r>
+              <a:rPr lang="en-GB" dirty="0" smtClean="0">
+                <a:sym typeface="Wingdings" panose="05000000000000000000" pitchFamily="2" charset="2"/>
+              </a:rPr>
+              <a:t> Slave</a:t>
+            </a:r>
+            <a:endParaRPr lang="en-GB" dirty="0" smtClean="0"/>
+          </a:p>
+          <a:p>
             <a:endParaRPr lang="en-GB" dirty="0" smtClean="0"/>
           </a:p>
           <a:p>
@@ -7417,6 +7445,96 @@
   <p:clrMapOvr>
     <a:masterClrMapping/>
   </p:clrMapOvr>
+  <p:timing>
+    <p:tnLst>
+      <p:par>
+        <p:cTn id="1" dur="indefinite" restart="never" nodeType="tmRoot"/>
+      </p:par>
+    </p:tnLst>
+  </p:timing>
+</p:sld>
+</file>
+
+<file path=ppt/slides/slide8.xml><?xml version="1.0" encoding="utf-8"?>
+<p:sld xmlns:a="http://schemas.openxmlformats.org/drawingml/2006/main" xmlns:r="http://schemas.openxmlformats.org/officeDocument/2006/relationships" xmlns:p="http://schemas.openxmlformats.org/presentationml/2006/main">
+  <p:cSld>
+    <p:spTree>
+      <p:nvGrpSpPr>
+        <p:cNvPr id="1" name=""/>
+        <p:cNvGrpSpPr/>
+        <p:nvPr/>
+      </p:nvGrpSpPr>
+      <p:grpSpPr>
+        <a:xfrm>
+          <a:off x="0" y="0"/>
+          <a:ext cx="0" cy="0"/>
+          <a:chOff x="0" y="0"/>
+          <a:chExt cx="0" cy="0"/>
+        </a:xfrm>
+      </p:grpSpPr>
+      <p:sp>
+        <p:nvSpPr>
+          <p:cNvPr id="2" name="Title 1"/>
+          <p:cNvSpPr>
+            <a:spLocks noGrp="1"/>
+          </p:cNvSpPr>
+          <p:nvPr>
+            <p:ph type="title"/>
+          </p:nvPr>
+        </p:nvSpPr>
+        <p:spPr/>
+        <p:txBody>
+          <a:bodyPr/>
+          <a:lstStyle/>
+          <a:p>
+            <a:endParaRPr lang="en-GB"/>
+          </a:p>
+        </p:txBody>
+      </p:sp>
+      <p:sp>
+        <p:nvSpPr>
+          <p:cNvPr id="3" name="Content Placeholder 2"/>
+          <p:cNvSpPr>
+            <a:spLocks noGrp="1"/>
+          </p:cNvSpPr>
+          <p:nvPr>
+            <p:ph idx="1"/>
+          </p:nvPr>
+        </p:nvSpPr>
+        <p:spPr/>
+        <p:txBody>
+          <a:bodyPr/>
+          <a:lstStyle/>
+          <a:p>
+            <a:r>
+              <a:rPr lang="en-GB" dirty="0" smtClean="0"/>
+              <a:t>github.com/fille044/</a:t>
+            </a:r>
+            <a:r>
+              <a:rPr lang="en-GB" dirty="0" err="1" smtClean="0"/>
+              <a:t>ConnectedBlinds</a:t>
+            </a:r>
+            <a:endParaRPr lang="en-GB" dirty="0"/>
+          </a:p>
+        </p:txBody>
+      </p:sp>
+    </p:spTree>
+    <p:extLst>
+      <p:ext uri="{BB962C8B-B14F-4D97-AF65-F5344CB8AC3E}">
+        <p14:creationId xmlns:p14="http://schemas.microsoft.com/office/powerpoint/2010/main" val="1953760036"/>
+      </p:ext>
+    </p:extLst>
+  </p:cSld>
+  <p:clrMapOvr>
+    <a:masterClrMapping/>
+  </p:clrMapOvr>
+  <p:timing>
+    <p:tnLst>
+      <p:par>
+        <p:cTn id="1" dur="indefinite" restart="never" nodeType="tmRoot"/>
+      </p:par>
+    </p:tnLst>
+  </p:timing>
 </p:sld>
 </file>
 

</xml_diff>